<commit_message>
ändrade sista delen till engelska
</commit_message>
<xml_diff>
--- a/Sociala medier 01-04 presentation.pptx
+++ b/Sociala medier 01-04 presentation.pptx
@@ -202,6 +202,7 @@
           <a:p>
             <a:fld id="{09B45D27-0554-400A-90EF-B5883169863F}" type="datetimeFigureOut">
               <a:rPr lang="sv-SE" smtClean="0"/>
+              <a:pPr/>
               <a:t>2015-03-31</a:t>
             </a:fld>
             <a:endParaRPr lang="sv-SE"/>
@@ -363,6 +364,7 @@
           <a:p>
             <a:fld id="{F5E1D48F-6023-49DA-A31A-2ECC6CB1EAD5}" type="slidenum">
               <a:rPr lang="sv-SE" smtClean="0"/>
+              <a:pPr/>
               <a:t>‹#›</a:t>
             </a:fld>
             <a:endParaRPr lang="sv-SE"/>
@@ -4926,7 +4928,7 @@
     </p:spTree>
     <p:extLst>
       <p:ext uri="{BB962C8B-B14F-4D97-AF65-F5344CB8AC3E}">
-        <p14:creationId xmlns:p14="http://schemas.microsoft.com/office/powerpoint/2010/main" xmlns="" val="3277165623"/>
+        <p14:creationId xmlns="" xmlns:p14="http://schemas.microsoft.com/office/powerpoint/2010/main" val="3277165623"/>
       </p:ext>
     </p:extLst>
   </p:cSld>
@@ -4977,7 +4979,7 @@
           <a:p>
             <a:r>
               <a:rPr lang="sv-SE" dirty="0" smtClean="0"/>
-              <a:t>Bloggar?</a:t>
+              <a:t>Bloggs</a:t>
             </a:r>
             <a:endParaRPr lang="sv-SE" dirty="0"/>
           </a:p>
@@ -5002,7 +5004,53 @@
           <a:p>
             <a:r>
               <a:rPr lang="sv-SE" dirty="0" smtClean="0"/>
-              <a:t>Vår slutsats är att att exkludera bloggar då det inte finns nått unisont system för detta och kan därför bli svårt att finna data</a:t>
+              <a:t>Our </a:t>
+            </a:r>
+            <a:r>
+              <a:rPr lang="sv-SE" dirty="0" err="1" smtClean="0"/>
+              <a:t>conclusion</a:t>
+            </a:r>
+            <a:r>
+              <a:rPr lang="sv-SE" dirty="0" smtClean="0"/>
+              <a:t>: </a:t>
+            </a:r>
+            <a:r>
+              <a:rPr lang="sv-SE" dirty="0" err="1" smtClean="0"/>
+              <a:t>exclude</a:t>
+            </a:r>
+            <a:r>
+              <a:rPr lang="sv-SE" dirty="0" smtClean="0"/>
+              <a:t> the bloggs</a:t>
+            </a:r>
+          </a:p>
+          <a:p>
+            <a:endParaRPr lang="sv-SE" dirty="0" smtClean="0">
+              <a:sym typeface="Wingdings"/>
+            </a:endParaRPr>
+          </a:p>
+          <a:p>
+            <a:endParaRPr lang="sv-SE" dirty="0" smtClean="0">
+              <a:sym typeface="Wingdings"/>
+            </a:endParaRPr>
+          </a:p>
+          <a:p>
+            <a:r>
+              <a:rPr lang="sv-SE" dirty="0" err="1" smtClean="0">
+                <a:sym typeface="Wingdings"/>
+              </a:rPr>
+              <a:t>Could</a:t>
+            </a:r>
+            <a:r>
+              <a:rPr lang="sv-SE" dirty="0" smtClean="0">
+                <a:sym typeface="Wingdings"/>
+              </a:rPr>
+              <a:t> be </a:t>
+            </a:r>
+            <a:r>
+              <a:rPr lang="sv-SE" dirty="0" err="1" smtClean="0">
+                <a:sym typeface="Wingdings"/>
+              </a:rPr>
+              <a:t>looked</a:t>
             </a:r>
             <a:r>
               <a:rPr lang="sv-SE" dirty="0" smtClean="0">
@@ -5010,13 +5058,41 @@
               </a:rPr>
               <a:t> </a:t>
             </a:r>
-          </a:p>
-          <a:p>
+            <a:r>
+              <a:rPr lang="sv-SE" dirty="0" err="1" smtClean="0">
+                <a:sym typeface="Wingdings"/>
+              </a:rPr>
+              <a:t>more</a:t>
+            </a:r>
             <a:r>
               <a:rPr lang="sv-SE" dirty="0" smtClean="0">
                 <a:sym typeface="Wingdings"/>
               </a:rPr>
-              <a:t>Någon som har annat förslag för att finna data? Spåna eller hojta till!</a:t>
+              <a:t> </a:t>
+            </a:r>
+            <a:r>
+              <a:rPr lang="sv-SE" dirty="0" err="1" smtClean="0">
+                <a:sym typeface="Wingdings"/>
+              </a:rPr>
+              <a:t>into</a:t>
+            </a:r>
+            <a:r>
+              <a:rPr lang="sv-SE" dirty="0" smtClean="0">
+                <a:sym typeface="Wingdings"/>
+              </a:rPr>
+              <a:t>= </a:t>
+            </a:r>
+            <a:r>
+              <a:rPr lang="sv-SE" dirty="0" err="1" smtClean="0">
+                <a:sym typeface="Wingdings"/>
+              </a:rPr>
+              <a:t>cost</a:t>
+            </a:r>
+            <a:r>
+              <a:rPr lang="sv-SE" dirty="0" smtClean="0">
+                <a:sym typeface="Wingdings"/>
+              </a:rPr>
+              <a:t> of time</a:t>
             </a:r>
             <a:endParaRPr lang="sv-SE" dirty="0" smtClean="0"/>
           </a:p>
@@ -5025,7 +5101,7 @@
     </p:spTree>
     <p:extLst>
       <p:ext uri="{BB962C8B-B14F-4D97-AF65-F5344CB8AC3E}">
-        <p14:creationId xmlns:p14="http://schemas.microsoft.com/office/powerpoint/2010/main" xmlns="" val="1819711001"/>
+        <p14:creationId xmlns="" xmlns:p14="http://schemas.microsoft.com/office/powerpoint/2010/main" val="1819711001"/>
       </p:ext>
     </p:extLst>
   </p:cSld>
@@ -5164,7 +5240,7 @@
     </p:spTree>
     <p:extLst>
       <p:ext uri="{BB962C8B-B14F-4D97-AF65-F5344CB8AC3E}">
-        <p14:creationId xmlns:p14="http://schemas.microsoft.com/office/powerpoint/2010/main" xmlns="" val="218366034"/>
+        <p14:creationId xmlns="" xmlns:p14="http://schemas.microsoft.com/office/powerpoint/2010/main" val="218366034"/>
       </p:ext>
     </p:extLst>
   </p:cSld>
@@ -5267,7 +5343,7 @@
     </p:spTree>
     <p:extLst>
       <p:ext uri="{BB962C8B-B14F-4D97-AF65-F5344CB8AC3E}">
-        <p14:creationId xmlns:p14="http://schemas.microsoft.com/office/powerpoint/2010/main" xmlns="" val="3796357991"/>
+        <p14:creationId xmlns="" xmlns:p14="http://schemas.microsoft.com/office/powerpoint/2010/main" val="3796357991"/>
       </p:ext>
     </p:extLst>
   </p:cSld>
@@ -5334,7 +5410,7 @@
           <a:blip r:embed="rId2">
             <a:extLst>
               <a:ext uri="{28A0092B-C50C-407E-A947-70E740481C1C}">
-                <a14:useLocalDpi xmlns:a14="http://schemas.microsoft.com/office/drawing/2010/main" xmlns="" val="0"/>
+                <a14:useLocalDpi xmlns="" xmlns:a14="http://schemas.microsoft.com/office/drawing/2010/main" val="0"/>
               </a:ext>
             </a:extLst>
           </a:blip>
@@ -5353,7 +5429,7 @@
     </p:spTree>
     <p:extLst>
       <p:ext uri="{BB962C8B-B14F-4D97-AF65-F5344CB8AC3E}">
-        <p14:creationId xmlns:p14="http://schemas.microsoft.com/office/powerpoint/2010/main" xmlns="" val="378133552"/>
+        <p14:creationId xmlns="" xmlns:p14="http://schemas.microsoft.com/office/powerpoint/2010/main" val="378133552"/>
       </p:ext>
     </p:extLst>
   </p:cSld>
@@ -5588,11 +5664,7 @@
             <a:pPr lvl="1"/>
             <a:r>
               <a:rPr lang="sv" dirty="0" smtClean="0"/>
-              <a:t>name, profile picture, </a:t>
-            </a:r>
-            <a:r>
-              <a:rPr lang="sv" dirty="0" smtClean="0"/>
-              <a:t>bio etc</a:t>
+              <a:t>name, profile picture, bio etc</a:t>
             </a:r>
           </a:p>
           <a:p>
@@ -5814,7 +5886,7 @@
           <a:blip r:embed="rId3">
             <a:extLst>
               <a:ext uri="{28A0092B-C50C-407E-A947-70E740481C1C}">
-                <a14:useLocalDpi xmlns:a14="http://schemas.microsoft.com/office/drawing/2010/main" xmlns="" val="0"/>
+                <a14:useLocalDpi xmlns="" xmlns:a14="http://schemas.microsoft.com/office/drawing/2010/main" val="0"/>
               </a:ext>
             </a:extLst>
           </a:blip>
@@ -5849,7 +5921,7 @@
           <a:blip r:embed="rId4">
             <a:extLst>
               <a:ext uri="{28A0092B-C50C-407E-A947-70E740481C1C}">
-                <a14:useLocalDpi xmlns:a14="http://schemas.microsoft.com/office/drawing/2010/main" xmlns="" val="0"/>
+                <a14:useLocalDpi xmlns="" xmlns:a14="http://schemas.microsoft.com/office/drawing/2010/main" val="0"/>
               </a:ext>
             </a:extLst>
           </a:blip>
@@ -5875,7 +5947,7 @@
     </p:spTree>
     <p:extLst>
       <p:ext uri="{BB962C8B-B14F-4D97-AF65-F5344CB8AC3E}">
-        <p14:creationId xmlns:p14="http://schemas.microsoft.com/office/powerpoint/2010/main" xmlns="" val="149493088"/>
+        <p14:creationId xmlns="" xmlns:p14="http://schemas.microsoft.com/office/powerpoint/2010/main" val="149493088"/>
       </p:ext>
     </p:extLst>
   </p:cSld>
@@ -6138,7 +6210,7 @@
     </p:spTree>
     <p:extLst>
       <p:ext uri="{BB962C8B-B14F-4D97-AF65-F5344CB8AC3E}">
-        <p14:creationId xmlns:p14="http://schemas.microsoft.com/office/powerpoint/2010/main" xmlns="" val="771286843"/>
+        <p14:creationId xmlns="" xmlns:p14="http://schemas.microsoft.com/office/powerpoint/2010/main" val="771286843"/>
       </p:ext>
     </p:extLst>
   </p:cSld>
@@ -6318,7 +6390,7 @@
     </p:spTree>
     <p:extLst>
       <p:ext uri="{BB962C8B-B14F-4D97-AF65-F5344CB8AC3E}">
-        <p14:creationId xmlns:p14="http://schemas.microsoft.com/office/powerpoint/2010/main" xmlns="" val="3048130568"/>
+        <p14:creationId xmlns="" xmlns:p14="http://schemas.microsoft.com/office/powerpoint/2010/main" val="3048130568"/>
       </p:ext>
     </p:extLst>
   </p:cSld>

</xml_diff>